<commit_message>
update paper as adviced
</commit_message>
<xml_diff>
--- a/graduation_thesis/figures/adds/adds.pptx
+++ b/graduation_thesis/figures/adds/adds.pptx
@@ -10,6 +10,7 @@
     <p:sldId id="259" r:id="rId5"/>
     <p:sldId id="258" r:id="rId6"/>
     <p:sldId id="260" r:id="rId7"/>
+    <p:sldId id="262" r:id="rId8"/>
   </p:sldIdLst>
   <p:sldSz cx="12192000" cy="6858000"/>
   <p:notesSz cx="6858000" cy="9144000"/>
@@ -6795,7 +6796,7 @@
         </p:nvSpPr>
         <p:spPr>
           <a:xfrm rot="10800000">
-            <a:off x="7504846" y="1597408"/>
+            <a:off x="7501671" y="1597408"/>
             <a:ext cx="647084" cy="189330"/>
           </a:xfrm>
           <a:prstGeom prst="leftArrow">
@@ -9407,6 +9408,1784 @@
               </a:solidFill>
               <a:latin typeface="Times New Roman" panose="02020603050405020304" pitchFamily="18" charset="0"/>
               <a:cs typeface="Times New Roman" panose="02020603050405020304" pitchFamily="18" charset="0"/>
+            </a:endParaRPr>
+          </a:p>
+        </p:txBody>
+      </p:sp>
+    </p:spTree>
+  </p:cSld>
+  <p:clrMapOvr>
+    <a:masterClrMapping/>
+  </p:clrMapOvr>
+</p:sld>
+</file>
+
+<file path=ppt/slides/slide6.xml><?xml version="1.0" encoding="utf-8"?>
+<p:sld xmlns:a="http://schemas.openxmlformats.org/drawingml/2006/main" xmlns:r="http://schemas.openxmlformats.org/officeDocument/2006/relationships" xmlns:p="http://schemas.openxmlformats.org/presentationml/2006/main">
+  <p:cSld>
+    <p:spTree>
+      <p:nvGrpSpPr>
+        <p:cNvPr id="1" name=""/>
+        <p:cNvGrpSpPr/>
+        <p:nvPr/>
+      </p:nvGrpSpPr>
+      <p:grpSpPr/>
+      <p:cxnSp>
+        <p:nvCxnSpPr>
+          <p:cNvPr id="97" name="连接符: 肘形 96"/>
+          <p:cNvCxnSpPr>
+            <a:stCxn id="12" idx="3"/>
+            <a:endCxn id="13" idx="3"/>
+          </p:cNvCxnSpPr>
+          <p:nvPr/>
+        </p:nvCxnSpPr>
+        <p:spPr>
+          <a:xfrm flipH="1">
+            <a:off x="3875405" y="3345180"/>
+            <a:ext cx="2838450" cy="711200"/>
+          </a:xfrm>
+          <a:prstGeom prst="bentConnector3">
+            <a:avLst>
+              <a:gd name="adj1" fmla="val -8389"/>
+            </a:avLst>
+          </a:prstGeom>
+          <a:ln>
+            <a:tailEnd type="triangle"/>
+          </a:ln>
+        </p:spPr>
+        <p:style>
+          <a:lnRef idx="3">
+            <a:schemeClr val="dk1"/>
+          </a:lnRef>
+          <a:fillRef idx="0">
+            <a:schemeClr val="dk1"/>
+          </a:fillRef>
+          <a:effectRef idx="2">
+            <a:schemeClr val="dk1"/>
+          </a:effectRef>
+          <a:fontRef idx="minor">
+            <a:schemeClr val="tx1"/>
+          </a:fontRef>
+        </p:style>
+      </p:cxnSp>
+      <p:sp>
+        <p:nvSpPr>
+          <p:cNvPr id="9" name="矩形 8"/>
+          <p:cNvSpPr/>
+          <p:nvPr/>
+        </p:nvSpPr>
+        <p:spPr>
+          <a:xfrm>
+            <a:off x="1344930" y="3123565"/>
+            <a:ext cx="720725" cy="443230"/>
+          </a:xfrm>
+          <a:prstGeom prst="rect">
+            <a:avLst/>
+          </a:prstGeom>
+          <a:solidFill>
+            <a:schemeClr val="bg1"/>
+          </a:solidFill>
+        </p:spPr>
+        <p:style>
+          <a:lnRef idx="2">
+            <a:schemeClr val="accent1">
+              <a:shade val="50000"/>
+            </a:schemeClr>
+          </a:lnRef>
+          <a:fillRef idx="1">
+            <a:schemeClr val="accent1"/>
+          </a:fillRef>
+          <a:effectRef idx="0">
+            <a:schemeClr val="accent1"/>
+          </a:effectRef>
+          <a:fontRef idx="minor">
+            <a:schemeClr val="lt1"/>
+          </a:fontRef>
+        </p:style>
+        <p:txBody>
+          <a:bodyPr rtlCol="0" anchor="ctr"/>
+          <a:p>
+            <a:pPr algn="ctr"/>
+            <a:r>
+              <a:rPr lang="zh-CN" altLang="en-US" sz="1050" b="1" dirty="0">
+                <a:solidFill>
+                  <a:schemeClr val="tx1"/>
+                </a:solidFill>
+                <a:latin typeface="Times New Roman" panose="02020603050405020304" pitchFamily="18" charset="0"/>
+                <a:ea typeface="宋体" panose="02010600030101010101" pitchFamily="2" charset="-122"/>
+                <a:cs typeface="Times New Roman" panose="02020603050405020304" pitchFamily="18" charset="0"/>
+              </a:rPr>
+              <a:t>编队控制器</a:t>
+            </a:r>
+            <a:endParaRPr lang="zh-CN" altLang="en-US" sz="1050" b="1" dirty="0">
+              <a:solidFill>
+                <a:schemeClr val="tx1"/>
+              </a:solidFill>
+              <a:latin typeface="Times New Roman" panose="02020603050405020304" pitchFamily="18" charset="0"/>
+              <a:ea typeface="宋体" panose="02010600030101010101" pitchFamily="2" charset="-122"/>
+              <a:cs typeface="Times New Roman" panose="02020603050405020304" pitchFamily="18" charset="0"/>
+            </a:endParaRPr>
+          </a:p>
+        </p:txBody>
+      </p:sp>
+      <p:sp>
+        <p:nvSpPr>
+          <p:cNvPr id="10" name="矩形 9"/>
+          <p:cNvSpPr/>
+          <p:nvPr/>
+        </p:nvSpPr>
+        <p:spPr>
+          <a:xfrm>
+            <a:off x="4122420" y="3123565"/>
+            <a:ext cx="720725" cy="443230"/>
+          </a:xfrm>
+          <a:prstGeom prst="rect">
+            <a:avLst/>
+          </a:prstGeom>
+          <a:solidFill>
+            <a:schemeClr val="bg1"/>
+          </a:solidFill>
+        </p:spPr>
+        <p:style>
+          <a:lnRef idx="2">
+            <a:schemeClr val="accent1">
+              <a:shade val="50000"/>
+            </a:schemeClr>
+          </a:lnRef>
+          <a:fillRef idx="1">
+            <a:schemeClr val="accent1"/>
+          </a:fillRef>
+          <a:effectRef idx="0">
+            <a:schemeClr val="accent1"/>
+          </a:effectRef>
+          <a:fontRef idx="minor">
+            <a:schemeClr val="lt1"/>
+          </a:fontRef>
+        </p:style>
+        <p:txBody>
+          <a:bodyPr rtlCol="0" anchor="ctr"/>
+          <a:p>
+            <a:pPr algn="ctr"/>
+            <a:r>
+              <a:rPr lang="zh-CN" altLang="en-US" sz="1050" b="1" dirty="0">
+                <a:solidFill>
+                  <a:schemeClr val="tx1"/>
+                </a:solidFill>
+                <a:latin typeface="Times New Roman" panose="02020603050405020304" pitchFamily="18" charset="0"/>
+                <a:ea typeface="宋体" panose="02010600030101010101" pitchFamily="2" charset="-122"/>
+                <a:cs typeface="Times New Roman" panose="02020603050405020304" pitchFamily="18" charset="0"/>
+              </a:rPr>
+              <a:t>舵回路</a:t>
+            </a:r>
+            <a:endParaRPr lang="zh-CN" altLang="en-US" sz="1050" b="1" dirty="0">
+              <a:solidFill>
+                <a:schemeClr val="tx1"/>
+              </a:solidFill>
+              <a:latin typeface="Times New Roman" panose="02020603050405020304" pitchFamily="18" charset="0"/>
+              <a:ea typeface="宋体" panose="02010600030101010101" pitchFamily="2" charset="-122"/>
+              <a:cs typeface="Times New Roman" panose="02020603050405020304" pitchFamily="18" charset="0"/>
+            </a:endParaRPr>
+          </a:p>
+        </p:txBody>
+      </p:sp>
+      <p:sp>
+        <p:nvSpPr>
+          <p:cNvPr id="11" name="矩形 10"/>
+          <p:cNvSpPr/>
+          <p:nvPr/>
+        </p:nvSpPr>
+        <p:spPr>
+          <a:xfrm>
+            <a:off x="5053330" y="3123565"/>
+            <a:ext cx="720725" cy="443230"/>
+          </a:xfrm>
+          <a:prstGeom prst="rect">
+            <a:avLst/>
+          </a:prstGeom>
+          <a:solidFill>
+            <a:schemeClr val="bg1"/>
+          </a:solidFill>
+        </p:spPr>
+        <p:style>
+          <a:lnRef idx="2">
+            <a:schemeClr val="accent1">
+              <a:shade val="50000"/>
+            </a:schemeClr>
+          </a:lnRef>
+          <a:fillRef idx="1">
+            <a:schemeClr val="accent1"/>
+          </a:fillRef>
+          <a:effectRef idx="0">
+            <a:schemeClr val="accent1"/>
+          </a:effectRef>
+          <a:fontRef idx="minor">
+            <a:schemeClr val="lt1"/>
+          </a:fontRef>
+        </p:style>
+        <p:txBody>
+          <a:bodyPr rtlCol="0" anchor="ctr"/>
+          <a:p>
+            <a:pPr algn="ctr"/>
+            <a:r>
+              <a:rPr lang="zh-CN" altLang="en-US" sz="1050" b="1" dirty="0">
+                <a:solidFill>
+                  <a:schemeClr val="tx1"/>
+                </a:solidFill>
+                <a:latin typeface="Times New Roman" panose="02020603050405020304" pitchFamily="18" charset="0"/>
+                <a:ea typeface="宋体" panose="02010600030101010101" pitchFamily="2" charset="-122"/>
+                <a:cs typeface="Times New Roman" panose="02020603050405020304" pitchFamily="18" charset="0"/>
+              </a:rPr>
+              <a:t>无人机空气动力学</a:t>
+            </a:r>
+            <a:endParaRPr lang="zh-CN" altLang="en-US" sz="1050" b="1" dirty="0">
+              <a:solidFill>
+                <a:schemeClr val="tx1"/>
+              </a:solidFill>
+              <a:latin typeface="Times New Roman" panose="02020603050405020304" pitchFamily="18" charset="0"/>
+              <a:ea typeface="宋体" panose="02010600030101010101" pitchFamily="2" charset="-122"/>
+              <a:cs typeface="Times New Roman" panose="02020603050405020304" pitchFamily="18" charset="0"/>
+            </a:endParaRPr>
+          </a:p>
+        </p:txBody>
+      </p:sp>
+      <p:sp>
+        <p:nvSpPr>
+          <p:cNvPr id="12" name="矩形 11"/>
+          <p:cNvSpPr/>
+          <p:nvPr/>
+        </p:nvSpPr>
+        <p:spPr>
+          <a:xfrm>
+            <a:off x="5993130" y="3123565"/>
+            <a:ext cx="720725" cy="443230"/>
+          </a:xfrm>
+          <a:prstGeom prst="rect">
+            <a:avLst/>
+          </a:prstGeom>
+          <a:solidFill>
+            <a:schemeClr val="bg1"/>
+          </a:solidFill>
+        </p:spPr>
+        <p:style>
+          <a:lnRef idx="2">
+            <a:schemeClr val="accent1">
+              <a:shade val="50000"/>
+            </a:schemeClr>
+          </a:lnRef>
+          <a:fillRef idx="1">
+            <a:schemeClr val="accent1"/>
+          </a:fillRef>
+          <a:effectRef idx="0">
+            <a:schemeClr val="accent1"/>
+          </a:effectRef>
+          <a:fontRef idx="minor">
+            <a:schemeClr val="lt1"/>
+          </a:fontRef>
+        </p:style>
+        <p:txBody>
+          <a:bodyPr rtlCol="0" anchor="ctr"/>
+          <a:p>
+            <a:pPr algn="ctr"/>
+            <a:r>
+              <a:rPr lang="zh-CN" altLang="en-US" sz="1050" b="1" dirty="0">
+                <a:solidFill>
+                  <a:schemeClr val="tx1"/>
+                </a:solidFill>
+                <a:latin typeface="Times New Roman" panose="02020603050405020304" pitchFamily="18" charset="0"/>
+                <a:ea typeface="宋体" panose="02010600030101010101" pitchFamily="2" charset="-122"/>
+                <a:cs typeface="Times New Roman" panose="02020603050405020304" pitchFamily="18" charset="0"/>
+              </a:rPr>
+              <a:t>无人机刚体动力学</a:t>
+            </a:r>
+            <a:endParaRPr lang="zh-CN" altLang="en-US" sz="1050" b="1" dirty="0">
+              <a:solidFill>
+                <a:schemeClr val="tx1"/>
+              </a:solidFill>
+              <a:latin typeface="Times New Roman" panose="02020603050405020304" pitchFamily="18" charset="0"/>
+              <a:ea typeface="宋体" panose="02010600030101010101" pitchFamily="2" charset="-122"/>
+              <a:cs typeface="Times New Roman" panose="02020603050405020304" pitchFamily="18" charset="0"/>
+            </a:endParaRPr>
+          </a:p>
+        </p:txBody>
+      </p:sp>
+      <p:sp>
+        <p:nvSpPr>
+          <p:cNvPr id="13" name="矩形 12"/>
+          <p:cNvSpPr/>
+          <p:nvPr/>
+        </p:nvSpPr>
+        <p:spPr>
+          <a:xfrm>
+            <a:off x="3154680" y="3834765"/>
+            <a:ext cx="720725" cy="443230"/>
+          </a:xfrm>
+          <a:prstGeom prst="rect">
+            <a:avLst/>
+          </a:prstGeom>
+          <a:solidFill>
+            <a:schemeClr val="bg1"/>
+          </a:solidFill>
+        </p:spPr>
+        <p:style>
+          <a:lnRef idx="2">
+            <a:schemeClr val="accent1">
+              <a:shade val="50000"/>
+            </a:schemeClr>
+          </a:lnRef>
+          <a:fillRef idx="1">
+            <a:schemeClr val="accent1"/>
+          </a:fillRef>
+          <a:effectRef idx="0">
+            <a:schemeClr val="accent1"/>
+          </a:effectRef>
+          <a:fontRef idx="minor">
+            <a:schemeClr val="lt1"/>
+          </a:fontRef>
+        </p:style>
+        <p:txBody>
+          <a:bodyPr rtlCol="0" anchor="ctr"/>
+          <a:p>
+            <a:pPr algn="ctr"/>
+            <a:r>
+              <a:rPr lang="zh-CN" altLang="en-US" sz="1050" b="1" dirty="0">
+                <a:solidFill>
+                  <a:schemeClr val="tx1"/>
+                </a:solidFill>
+                <a:latin typeface="Times New Roman" panose="02020603050405020304" pitchFamily="18" charset="0"/>
+                <a:ea typeface="宋体" panose="02010600030101010101" pitchFamily="2" charset="-122"/>
+                <a:cs typeface="Times New Roman" panose="02020603050405020304" pitchFamily="18" charset="0"/>
+              </a:rPr>
+              <a:t>量测估计模块</a:t>
+            </a:r>
+            <a:endParaRPr lang="zh-CN" altLang="en-US" sz="1050" b="1" dirty="0">
+              <a:solidFill>
+                <a:schemeClr val="tx1"/>
+              </a:solidFill>
+              <a:latin typeface="Times New Roman" panose="02020603050405020304" pitchFamily="18" charset="0"/>
+              <a:ea typeface="宋体" panose="02010600030101010101" pitchFamily="2" charset="-122"/>
+              <a:cs typeface="Times New Roman" panose="02020603050405020304" pitchFamily="18" charset="0"/>
+            </a:endParaRPr>
+          </a:p>
+        </p:txBody>
+      </p:sp>
+      <p:cxnSp>
+        <p:nvCxnSpPr>
+          <p:cNvPr id="16" name="直接箭头连接符 15"/>
+          <p:cNvCxnSpPr>
+            <a:stCxn id="9" idx="3"/>
+            <a:endCxn id="5" idx="1"/>
+          </p:cNvCxnSpPr>
+          <p:nvPr/>
+        </p:nvCxnSpPr>
+        <p:spPr>
+          <a:xfrm>
+            <a:off x="2065655" y="3345180"/>
+            <a:ext cx="1089025" cy="1905"/>
+          </a:xfrm>
+          <a:prstGeom prst="straightConnector1">
+            <a:avLst/>
+          </a:prstGeom>
+          <a:ln>
+            <a:tailEnd type="triangle"/>
+          </a:ln>
+        </p:spPr>
+        <p:style>
+          <a:lnRef idx="3">
+            <a:schemeClr val="dk1"/>
+          </a:lnRef>
+          <a:fillRef idx="0">
+            <a:schemeClr val="dk1"/>
+          </a:fillRef>
+          <a:effectRef idx="2">
+            <a:schemeClr val="dk1"/>
+          </a:effectRef>
+          <a:fontRef idx="minor">
+            <a:schemeClr val="tx1"/>
+          </a:fontRef>
+        </p:style>
+      </p:cxnSp>
+      <p:cxnSp>
+        <p:nvCxnSpPr>
+          <p:cNvPr id="17" name="直接箭头连接符 16"/>
+          <p:cNvCxnSpPr>
+            <a:stCxn id="10" idx="3"/>
+            <a:endCxn id="11" idx="1"/>
+          </p:cNvCxnSpPr>
+          <p:nvPr/>
+        </p:nvCxnSpPr>
+        <p:spPr>
+          <a:xfrm>
+            <a:off x="4843145" y="3345180"/>
+            <a:ext cx="210185" cy="0"/>
+          </a:xfrm>
+          <a:prstGeom prst="straightConnector1">
+            <a:avLst/>
+          </a:prstGeom>
+          <a:ln>
+            <a:tailEnd type="triangle"/>
+          </a:ln>
+        </p:spPr>
+        <p:style>
+          <a:lnRef idx="3">
+            <a:schemeClr val="dk1"/>
+          </a:lnRef>
+          <a:fillRef idx="0">
+            <a:schemeClr val="dk1"/>
+          </a:fillRef>
+          <a:effectRef idx="2">
+            <a:schemeClr val="dk1"/>
+          </a:effectRef>
+          <a:fontRef idx="minor">
+            <a:schemeClr val="tx1"/>
+          </a:fontRef>
+        </p:style>
+      </p:cxnSp>
+      <p:cxnSp>
+        <p:nvCxnSpPr>
+          <p:cNvPr id="18" name="直接箭头连接符 17"/>
+          <p:cNvCxnSpPr>
+            <a:stCxn id="11" idx="3"/>
+            <a:endCxn id="12" idx="1"/>
+          </p:cNvCxnSpPr>
+          <p:nvPr/>
+        </p:nvCxnSpPr>
+        <p:spPr>
+          <a:xfrm>
+            <a:off x="5774055" y="3345180"/>
+            <a:ext cx="219075" cy="0"/>
+          </a:xfrm>
+          <a:prstGeom prst="straightConnector1">
+            <a:avLst/>
+          </a:prstGeom>
+          <a:ln>
+            <a:tailEnd type="triangle"/>
+          </a:ln>
+        </p:spPr>
+        <p:style>
+          <a:lnRef idx="3">
+            <a:schemeClr val="dk1"/>
+          </a:lnRef>
+          <a:fillRef idx="0">
+            <a:schemeClr val="dk1"/>
+          </a:fillRef>
+          <a:effectRef idx="2">
+            <a:schemeClr val="dk1"/>
+          </a:effectRef>
+          <a:fontRef idx="minor">
+            <a:schemeClr val="tx1"/>
+          </a:fontRef>
+        </p:style>
+      </p:cxnSp>
+      <p:sp>
+        <p:nvSpPr>
+          <p:cNvPr id="23" name="文本框 22"/>
+          <p:cNvSpPr txBox="1"/>
+          <p:nvPr/>
+        </p:nvSpPr>
+        <p:spPr>
+          <a:xfrm>
+            <a:off x="5148580" y="4086225"/>
+            <a:ext cx="828675" cy="229870"/>
+          </a:xfrm>
+          <a:prstGeom prst="rect">
+            <a:avLst/>
+          </a:prstGeom>
+          <a:noFill/>
+        </p:spPr>
+        <p:txBody>
+          <a:bodyPr wrap="square" rtlCol="0" anchor="t">
+            <a:spAutoFit/>
+          </a:bodyPr>
+          <a:p>
+            <a:pPr algn="ctr"/>
+            <a:r>
+              <a:rPr lang="zh-CN" altLang="en-US" sz="900" b="1"/>
+              <a:t>状态量</a:t>
+            </a:r>
+            <a:endParaRPr lang="zh-CN" altLang="en-US" sz="900" b="1"/>
+          </a:p>
+        </p:txBody>
+      </p:sp>
+      <p:sp>
+        <p:nvSpPr>
+          <p:cNvPr id="33" name="流程图: 接点 173"/>
+          <p:cNvSpPr/>
+          <p:nvPr/>
+        </p:nvSpPr>
+        <p:spPr>
+          <a:xfrm>
+            <a:off x="835005" y="3203100"/>
+            <a:ext cx="280416" cy="280416"/>
+          </a:xfrm>
+          <a:prstGeom prst="flowChartConnector">
+            <a:avLst/>
+          </a:prstGeom>
+          <a:noFill/>
+          <a:ln>
+            <a:solidFill>
+              <a:schemeClr val="tx1"/>
+            </a:solidFill>
+          </a:ln>
+        </p:spPr>
+        <p:style>
+          <a:lnRef idx="2">
+            <a:schemeClr val="accent1">
+              <a:shade val="50000"/>
+            </a:schemeClr>
+          </a:lnRef>
+          <a:fillRef idx="1">
+            <a:schemeClr val="accent1"/>
+          </a:fillRef>
+          <a:effectRef idx="0">
+            <a:schemeClr val="accent1"/>
+          </a:effectRef>
+          <a:fontRef idx="minor">
+            <a:schemeClr val="lt1"/>
+          </a:fontRef>
+        </p:style>
+        <p:txBody>
+          <a:bodyPr rtlCol="0" anchor="ctr"/>
+          <a:p>
+            <a:pPr algn="ctr"/>
+            <a:endParaRPr lang="zh-CN" altLang="en-US">
+              <a:latin typeface="Times New Roman" panose="02020603050405020304" pitchFamily="18" charset="0"/>
+              <a:cs typeface="Times New Roman" panose="02020603050405020304" pitchFamily="18" charset="0"/>
+            </a:endParaRPr>
+          </a:p>
+        </p:txBody>
+      </p:sp>
+      <p:cxnSp>
+        <p:nvCxnSpPr>
+          <p:cNvPr id="34" name="直接连接符 33"/>
+          <p:cNvCxnSpPr>
+            <a:stCxn id="33" idx="1"/>
+            <a:endCxn id="33" idx="5"/>
+          </p:cNvCxnSpPr>
+          <p:nvPr/>
+        </p:nvCxnSpPr>
+        <p:spPr>
+          <a:xfrm>
+            <a:off x="876071" y="3244166"/>
+            <a:ext cx="198120" cy="198120"/>
+          </a:xfrm>
+          <a:prstGeom prst="line">
+            <a:avLst/>
+          </a:prstGeom>
+          <a:ln>
+            <a:solidFill>
+              <a:schemeClr val="tx1"/>
+            </a:solidFill>
+          </a:ln>
+        </p:spPr>
+        <p:style>
+          <a:lnRef idx="1">
+            <a:schemeClr val="accent1"/>
+          </a:lnRef>
+          <a:fillRef idx="0">
+            <a:schemeClr val="accent1"/>
+          </a:fillRef>
+          <a:effectRef idx="0">
+            <a:schemeClr val="accent1"/>
+          </a:effectRef>
+          <a:fontRef idx="minor">
+            <a:schemeClr val="tx1"/>
+          </a:fontRef>
+        </p:style>
+      </p:cxnSp>
+      <p:cxnSp>
+        <p:nvCxnSpPr>
+          <p:cNvPr id="35" name="直接连接符 34"/>
+          <p:cNvCxnSpPr>
+            <a:stCxn id="33" idx="7"/>
+            <a:endCxn id="33" idx="3"/>
+          </p:cNvCxnSpPr>
+          <p:nvPr/>
+        </p:nvCxnSpPr>
+        <p:spPr>
+          <a:xfrm flipH="1">
+            <a:off x="876235" y="3244166"/>
+            <a:ext cx="198120" cy="198120"/>
+          </a:xfrm>
+          <a:prstGeom prst="line">
+            <a:avLst/>
+          </a:prstGeom>
+          <a:ln>
+            <a:solidFill>
+              <a:schemeClr val="tx1"/>
+            </a:solidFill>
+          </a:ln>
+        </p:spPr>
+        <p:style>
+          <a:lnRef idx="1">
+            <a:schemeClr val="accent1"/>
+          </a:lnRef>
+          <a:fillRef idx="0">
+            <a:schemeClr val="accent1"/>
+          </a:fillRef>
+          <a:effectRef idx="0">
+            <a:schemeClr val="accent1"/>
+          </a:effectRef>
+          <a:fontRef idx="minor">
+            <a:schemeClr val="tx1"/>
+          </a:fontRef>
+        </p:style>
+      </p:cxnSp>
+      <p:cxnSp>
+        <p:nvCxnSpPr>
+          <p:cNvPr id="36" name="直接箭头连接符 35"/>
+          <p:cNvCxnSpPr/>
+          <p:nvPr/>
+        </p:nvCxnSpPr>
+        <p:spPr>
+          <a:xfrm flipV="1">
+            <a:off x="1112520" y="3340100"/>
+            <a:ext cx="230505" cy="635"/>
+          </a:xfrm>
+          <a:prstGeom prst="straightConnector1">
+            <a:avLst/>
+          </a:prstGeom>
+          <a:ln>
+            <a:tailEnd type="triangle"/>
+          </a:ln>
+        </p:spPr>
+        <p:style>
+          <a:lnRef idx="3">
+            <a:schemeClr val="dk1"/>
+          </a:lnRef>
+          <a:fillRef idx="0">
+            <a:schemeClr val="dk1"/>
+          </a:fillRef>
+          <a:effectRef idx="2">
+            <a:schemeClr val="dk1"/>
+          </a:effectRef>
+          <a:fontRef idx="minor">
+            <a:schemeClr val="tx1"/>
+          </a:fontRef>
+        </p:style>
+      </p:cxnSp>
+      <p:cxnSp>
+        <p:nvCxnSpPr>
+          <p:cNvPr id="37" name="连接符: 肘形 96"/>
+          <p:cNvCxnSpPr>
+            <a:stCxn id="13" idx="1"/>
+            <a:endCxn id="33" idx="4"/>
+          </p:cNvCxnSpPr>
+          <p:nvPr/>
+        </p:nvCxnSpPr>
+        <p:spPr>
+          <a:xfrm rot="10800000">
+            <a:off x="975360" y="3483610"/>
+            <a:ext cx="2179320" cy="572770"/>
+          </a:xfrm>
+          <a:prstGeom prst="bentConnector2">
+            <a:avLst/>
+          </a:prstGeom>
+          <a:ln>
+            <a:tailEnd type="triangle"/>
+          </a:ln>
+        </p:spPr>
+        <p:style>
+          <a:lnRef idx="3">
+            <a:schemeClr val="dk1"/>
+          </a:lnRef>
+          <a:fillRef idx="0">
+            <a:schemeClr val="dk1"/>
+          </a:fillRef>
+          <a:effectRef idx="2">
+            <a:schemeClr val="dk1"/>
+          </a:effectRef>
+          <a:fontRef idx="minor">
+            <a:schemeClr val="tx1"/>
+          </a:fontRef>
+        </p:style>
+      </p:cxnSp>
+      <p:sp>
+        <p:nvSpPr>
+          <p:cNvPr id="38" name="文本框 37"/>
+          <p:cNvSpPr txBox="1"/>
+          <p:nvPr/>
+        </p:nvSpPr>
+        <p:spPr>
+          <a:xfrm>
+            <a:off x="1851025" y="4086225"/>
+            <a:ext cx="828675" cy="229870"/>
+          </a:xfrm>
+          <a:prstGeom prst="rect">
+            <a:avLst/>
+          </a:prstGeom>
+          <a:noFill/>
+        </p:spPr>
+        <p:txBody>
+          <a:bodyPr wrap="square" rtlCol="0" anchor="t">
+            <a:spAutoFit/>
+          </a:bodyPr>
+          <a:p>
+            <a:pPr algn="ctr"/>
+            <a:r>
+              <a:rPr lang="zh-CN" altLang="en-US" sz="900" b="1"/>
+              <a:t>姿态估计</a:t>
+            </a:r>
+            <a:endParaRPr lang="zh-CN" altLang="en-US" sz="900" b="1"/>
+          </a:p>
+        </p:txBody>
+      </p:sp>
+      <p:graphicFrame>
+        <p:nvGraphicFramePr>
+          <p:cNvPr id="41" name="对象 40"/>
+          <p:cNvGraphicFramePr>
+            <a:graphicFrameLocks noChangeAspect="1"/>
+          </p:cNvGraphicFramePr>
+          <p:nvPr/>
+        </p:nvGraphicFramePr>
+        <p:xfrm>
+          <a:off x="1001185" y="3566754"/>
+          <a:ext cx="114300" cy="100013"/>
+        </p:xfrm>
+        <a:graphic>
+          <a:graphicData uri="http://schemas.openxmlformats.org/presentationml/2006/ole">
+            <mc:AlternateContent xmlns:mc="http://schemas.openxmlformats.org/markup-compatibility/2006">
+              <mc:Choice xmlns:v="urn:schemas-microsoft-com:vml" Requires="v">
+                <p:oleObj spid="_x0000_s42" name="Equation" r:id="rId1" imgW="96520" imgH="83820" progId="Equation.DSMT4">
+                  <p:embed/>
+                </p:oleObj>
+              </mc:Choice>
+              <mc:Fallback>
+                <p:oleObj name="Equation" r:id="rId1" imgW="96520" imgH="83820" progId="Equation.DSMT4">
+                  <p:embed/>
+                  <p:pic>
+                    <p:nvPicPr>
+                      <p:cNvPr id="0" name="对象 119"/>
+                      <p:cNvPicPr/>
+                      <p:nvPr/>
+                    </p:nvPicPr>
+                    <p:blipFill>
+                      <a:blip r:embed="rId2"/>
+                      <a:stretch>
+                        <a:fillRect/>
+                      </a:stretch>
+                    </p:blipFill>
+                    <p:spPr>
+                      <a:xfrm>
+                        <a:off x="1001185" y="3566754"/>
+                        <a:ext cx="114300" cy="100013"/>
+                      </a:xfrm>
+                      <a:prstGeom prst="rect">
+                        <a:avLst/>
+                      </a:prstGeom>
+                    </p:spPr>
+                  </p:pic>
+                </p:oleObj>
+              </mc:Fallback>
+            </mc:AlternateContent>
+          </a:graphicData>
+        </a:graphic>
+      </p:graphicFrame>
+      <p:cxnSp>
+        <p:nvCxnSpPr>
+          <p:cNvPr id="47" name="连接符: 肘形 96"/>
+          <p:cNvCxnSpPr/>
+          <p:nvPr/>
+        </p:nvCxnSpPr>
+        <p:spPr>
+          <a:xfrm>
+            <a:off x="4748530" y="736600"/>
+            <a:ext cx="2216150" cy="308610"/>
+          </a:xfrm>
+          <a:prstGeom prst="bentConnector2">
+            <a:avLst/>
+          </a:prstGeom>
+          <a:ln>
+            <a:prstDash val="dash"/>
+            <a:tailEnd type="triangle"/>
+          </a:ln>
+        </p:spPr>
+        <p:style>
+          <a:lnRef idx="3">
+            <a:schemeClr val="dk1"/>
+          </a:lnRef>
+          <a:fillRef idx="0">
+            <a:schemeClr val="dk1"/>
+          </a:fillRef>
+          <a:effectRef idx="2">
+            <a:schemeClr val="dk1"/>
+          </a:effectRef>
+          <a:fontRef idx="minor">
+            <a:schemeClr val="tx1"/>
+          </a:fontRef>
+        </p:style>
+      </p:cxnSp>
+      <p:sp>
+        <p:nvSpPr>
+          <p:cNvPr id="53" name="文本框 52"/>
+          <p:cNvSpPr txBox="1"/>
+          <p:nvPr/>
+        </p:nvSpPr>
+        <p:spPr>
+          <a:xfrm>
+            <a:off x="3042285" y="1663065"/>
+            <a:ext cx="944880" cy="275590"/>
+          </a:xfrm>
+          <a:prstGeom prst="rect">
+            <a:avLst/>
+          </a:prstGeom>
+          <a:noFill/>
+        </p:spPr>
+        <p:txBody>
+          <a:bodyPr wrap="none" rtlCol="0" anchor="t">
+            <a:spAutoFit/>
+          </a:bodyPr>
+          <a:p>
+            <a:pPr algn="ctr"/>
+            <a:r>
+              <a:rPr lang="zh-CN" altLang="en-US" sz="1200">
+                <a:solidFill>
+                  <a:srgbClr val="FF0000"/>
+                </a:solidFill>
+              </a:rPr>
+              <a:t>自动驾驶仪</a:t>
+            </a:r>
+            <a:endParaRPr lang="zh-CN" altLang="en-US" sz="1200">
+              <a:solidFill>
+                <a:srgbClr val="FF0000"/>
+              </a:solidFill>
+            </a:endParaRPr>
+          </a:p>
+        </p:txBody>
+      </p:sp>
+      <p:sp>
+        <p:nvSpPr>
+          <p:cNvPr id="54" name="文本框 53"/>
+          <p:cNvSpPr txBox="1"/>
+          <p:nvPr/>
+        </p:nvSpPr>
+        <p:spPr>
+          <a:xfrm>
+            <a:off x="5136515" y="1663065"/>
+            <a:ext cx="1097280" cy="275590"/>
+          </a:xfrm>
+          <a:prstGeom prst="rect">
+            <a:avLst/>
+          </a:prstGeom>
+          <a:noFill/>
+        </p:spPr>
+        <p:txBody>
+          <a:bodyPr wrap="none" rtlCol="0" anchor="t">
+            <a:spAutoFit/>
+          </a:bodyPr>
+          <a:p>
+            <a:pPr algn="ctr"/>
+            <a:r>
+              <a:rPr lang="zh-CN" altLang="en-US" sz="1200">
+                <a:solidFill>
+                  <a:srgbClr val="FF0000"/>
+                </a:solidFill>
+              </a:rPr>
+              <a:t>无人机动力学</a:t>
+            </a:r>
+            <a:endParaRPr lang="zh-CN" altLang="en-US" sz="1200">
+              <a:solidFill>
+                <a:srgbClr val="FF0000"/>
+              </a:solidFill>
+            </a:endParaRPr>
+          </a:p>
+        </p:txBody>
+      </p:sp>
+      <p:sp>
+        <p:nvSpPr>
+          <p:cNvPr id="5" name="矩形 4"/>
+          <p:cNvSpPr/>
+          <p:nvPr/>
+        </p:nvSpPr>
+        <p:spPr>
+          <a:xfrm>
+            <a:off x="3154680" y="3125470"/>
+            <a:ext cx="720725" cy="443230"/>
+          </a:xfrm>
+          <a:prstGeom prst="rect">
+            <a:avLst/>
+          </a:prstGeom>
+          <a:solidFill>
+            <a:schemeClr val="bg1"/>
+          </a:solidFill>
+        </p:spPr>
+        <p:style>
+          <a:lnRef idx="2">
+            <a:schemeClr val="accent1">
+              <a:shade val="50000"/>
+            </a:schemeClr>
+          </a:lnRef>
+          <a:fillRef idx="1">
+            <a:schemeClr val="accent1"/>
+          </a:fillRef>
+          <a:effectRef idx="0">
+            <a:schemeClr val="accent1"/>
+          </a:effectRef>
+          <a:fontRef idx="minor">
+            <a:schemeClr val="lt1"/>
+          </a:fontRef>
+        </p:style>
+        <p:txBody>
+          <a:bodyPr rtlCol="0" anchor="ctr"/>
+          <a:p>
+            <a:pPr algn="ctr"/>
+            <a:r>
+              <a:rPr lang="zh-CN" altLang="en-US" sz="1050" b="1" dirty="0">
+                <a:solidFill>
+                  <a:schemeClr val="tx1"/>
+                </a:solidFill>
+                <a:latin typeface="Times New Roman" panose="02020603050405020304" pitchFamily="18" charset="0"/>
+                <a:ea typeface="宋体" panose="02010600030101010101" pitchFamily="2" charset="-122"/>
+                <a:cs typeface="Times New Roman" panose="02020603050405020304" pitchFamily="18" charset="0"/>
+              </a:rPr>
+              <a:t>姿态驾驶仪</a:t>
+            </a:r>
+            <a:endParaRPr lang="zh-CN" altLang="en-US" sz="1050" b="1" dirty="0">
+              <a:solidFill>
+                <a:schemeClr val="tx1"/>
+              </a:solidFill>
+              <a:latin typeface="Times New Roman" panose="02020603050405020304" pitchFamily="18" charset="0"/>
+              <a:ea typeface="宋体" panose="02010600030101010101" pitchFamily="2" charset="-122"/>
+              <a:cs typeface="Times New Roman" panose="02020603050405020304" pitchFamily="18" charset="0"/>
+            </a:endParaRPr>
+          </a:p>
+        </p:txBody>
+      </p:sp>
+      <p:cxnSp>
+        <p:nvCxnSpPr>
+          <p:cNvPr id="6" name="直接箭头连接符 5"/>
+          <p:cNvCxnSpPr/>
+          <p:nvPr/>
+        </p:nvCxnSpPr>
+        <p:spPr>
+          <a:xfrm>
+            <a:off x="626110" y="3340100"/>
+            <a:ext cx="208915" cy="0"/>
+          </a:xfrm>
+          <a:prstGeom prst="straightConnector1">
+            <a:avLst/>
+          </a:prstGeom>
+          <a:ln>
+            <a:tailEnd type="triangle"/>
+          </a:ln>
+        </p:spPr>
+        <p:style>
+          <a:lnRef idx="3">
+            <a:schemeClr val="dk1"/>
+          </a:lnRef>
+          <a:fillRef idx="0">
+            <a:schemeClr val="dk1"/>
+          </a:fillRef>
+          <a:effectRef idx="2">
+            <a:schemeClr val="dk1"/>
+          </a:effectRef>
+          <a:fontRef idx="minor">
+            <a:schemeClr val="tx1"/>
+          </a:fontRef>
+        </p:style>
+      </p:cxnSp>
+      <p:sp>
+        <p:nvSpPr>
+          <p:cNvPr id="45" name="文本框 44"/>
+          <p:cNvSpPr txBox="1"/>
+          <p:nvPr/>
+        </p:nvSpPr>
+        <p:spPr>
+          <a:xfrm>
+            <a:off x="1133475" y="1663065"/>
+            <a:ext cx="944880" cy="275590"/>
+          </a:xfrm>
+          <a:prstGeom prst="rect">
+            <a:avLst/>
+          </a:prstGeom>
+          <a:noFill/>
+        </p:spPr>
+        <p:txBody>
+          <a:bodyPr wrap="none" rtlCol="0" anchor="t">
+            <a:spAutoFit/>
+          </a:bodyPr>
+          <a:p>
+            <a:pPr algn="ctr"/>
+            <a:r>
+              <a:rPr lang="zh-CN" altLang="en-US" sz="1200">
+                <a:solidFill>
+                  <a:srgbClr val="FF0000"/>
+                </a:solidFill>
+              </a:rPr>
+              <a:t>编队控制器</a:t>
+            </a:r>
+            <a:endParaRPr lang="zh-CN" altLang="en-US" sz="1200">
+              <a:solidFill>
+                <a:srgbClr val="FF0000"/>
+              </a:solidFill>
+            </a:endParaRPr>
+          </a:p>
+        </p:txBody>
+      </p:sp>
+      <p:cxnSp>
+        <p:nvCxnSpPr>
+          <p:cNvPr id="55" name="直接箭头连接符 54"/>
+          <p:cNvCxnSpPr>
+            <a:stCxn id="5" idx="3"/>
+            <a:endCxn id="10" idx="1"/>
+          </p:cNvCxnSpPr>
+          <p:nvPr/>
+        </p:nvCxnSpPr>
+        <p:spPr>
+          <a:xfrm flipV="1">
+            <a:off x="3875405" y="3345180"/>
+            <a:ext cx="247015" cy="1905"/>
+          </a:xfrm>
+          <a:prstGeom prst="straightConnector1">
+            <a:avLst/>
+          </a:prstGeom>
+          <a:ln>
+            <a:tailEnd type="triangle"/>
+          </a:ln>
+        </p:spPr>
+        <p:style>
+          <a:lnRef idx="3">
+            <a:schemeClr val="dk1"/>
+          </a:lnRef>
+          <a:fillRef idx="0">
+            <a:schemeClr val="dk1"/>
+          </a:fillRef>
+          <a:effectRef idx="2">
+            <a:schemeClr val="dk1"/>
+          </a:effectRef>
+          <a:fontRef idx="minor">
+            <a:schemeClr val="tx1"/>
+          </a:fontRef>
+        </p:style>
+      </p:cxnSp>
+      <p:sp>
+        <p:nvSpPr>
+          <p:cNvPr id="56" name="矩形 55"/>
+          <p:cNvSpPr/>
+          <p:nvPr/>
+        </p:nvSpPr>
+        <p:spPr>
+          <a:xfrm>
+            <a:off x="4047490" y="1861820"/>
+            <a:ext cx="3158490" cy="2898140"/>
+          </a:xfrm>
+          <a:prstGeom prst="rect">
+            <a:avLst/>
+          </a:prstGeom>
+          <a:noFill/>
+          <a:ln>
+            <a:solidFill>
+              <a:srgbClr val="FF0000"/>
+            </a:solidFill>
+            <a:prstDash val="dashDot"/>
+          </a:ln>
+          <a:extLst>
+            <a:ext uri="{909E8E84-426E-40DD-AFC4-6F175D3DCCD1}">
+              <a14:hiddenFill xmlns:a14="http://schemas.microsoft.com/office/drawing/2010/main">
+                <a:solidFill>
+                  <a:schemeClr val="bg1"/>
+                </a:solidFill>
+              </a14:hiddenFill>
+            </a:ext>
+          </a:extLst>
+        </p:spPr>
+        <p:style>
+          <a:lnRef idx="2">
+            <a:schemeClr val="accent1">
+              <a:shade val="50000"/>
+            </a:schemeClr>
+          </a:lnRef>
+          <a:fillRef idx="1">
+            <a:schemeClr val="accent1"/>
+          </a:fillRef>
+          <a:effectRef idx="0">
+            <a:schemeClr val="accent1"/>
+          </a:effectRef>
+          <a:fontRef idx="minor">
+            <a:schemeClr val="lt1"/>
+          </a:fontRef>
+        </p:style>
+        <p:txBody>
+          <a:bodyPr rtlCol="0" anchor="ctr"/>
+          <a:p>
+            <a:pPr algn="ctr"/>
+            <a:endParaRPr lang="zh-CN" altLang="en-US" sz="1050" b="1" dirty="0">
+              <a:solidFill>
+                <a:schemeClr val="tx1"/>
+              </a:solidFill>
+              <a:latin typeface="Times New Roman" panose="02020603050405020304" pitchFamily="18" charset="0"/>
+              <a:ea typeface="宋体" panose="02010600030101010101" pitchFamily="2" charset="-122"/>
+              <a:cs typeface="Times New Roman" panose="02020603050405020304" pitchFamily="18" charset="0"/>
+            </a:endParaRPr>
+          </a:p>
+        </p:txBody>
+      </p:sp>
+      <p:sp>
+        <p:nvSpPr>
+          <p:cNvPr id="57" name="文本框 56"/>
+          <p:cNvSpPr txBox="1"/>
+          <p:nvPr/>
+        </p:nvSpPr>
+        <p:spPr>
+          <a:xfrm>
+            <a:off x="3042285" y="1663065"/>
+            <a:ext cx="944880" cy="275590"/>
+          </a:xfrm>
+          <a:prstGeom prst="rect">
+            <a:avLst/>
+          </a:prstGeom>
+          <a:noFill/>
+        </p:spPr>
+        <p:txBody>
+          <a:bodyPr wrap="none" rtlCol="0" anchor="t">
+            <a:spAutoFit/>
+          </a:bodyPr>
+          <a:p>
+            <a:pPr algn="ctr"/>
+            <a:r>
+              <a:rPr lang="zh-CN" altLang="en-US" sz="1200">
+                <a:solidFill>
+                  <a:srgbClr val="FF0000"/>
+                </a:solidFill>
+              </a:rPr>
+              <a:t>自动驾驶仪</a:t>
+            </a:r>
+            <a:endParaRPr lang="zh-CN" altLang="en-US" sz="1200">
+              <a:solidFill>
+                <a:srgbClr val="FF0000"/>
+              </a:solidFill>
+            </a:endParaRPr>
+          </a:p>
+        </p:txBody>
+      </p:sp>
+      <p:sp>
+        <p:nvSpPr>
+          <p:cNvPr id="59" name="矩形 58"/>
+          <p:cNvSpPr/>
+          <p:nvPr/>
+        </p:nvSpPr>
+        <p:spPr>
+          <a:xfrm>
+            <a:off x="4122420" y="2355850"/>
+            <a:ext cx="720725" cy="443230"/>
+          </a:xfrm>
+          <a:prstGeom prst="rect">
+            <a:avLst/>
+          </a:prstGeom>
+          <a:solidFill>
+            <a:schemeClr val="bg1"/>
+          </a:solidFill>
+        </p:spPr>
+        <p:style>
+          <a:lnRef idx="2">
+            <a:schemeClr val="accent1">
+              <a:shade val="50000"/>
+            </a:schemeClr>
+          </a:lnRef>
+          <a:fillRef idx="1">
+            <a:schemeClr val="accent1"/>
+          </a:fillRef>
+          <a:effectRef idx="0">
+            <a:schemeClr val="accent1"/>
+          </a:effectRef>
+          <a:fontRef idx="minor">
+            <a:schemeClr val="lt1"/>
+          </a:fontRef>
+        </p:style>
+        <p:txBody>
+          <a:bodyPr rtlCol="0" anchor="ctr"/>
+          <a:p>
+            <a:pPr algn="ctr"/>
+            <a:endParaRPr lang="zh-CN" altLang="en-US" sz="1050" b="1" dirty="0">
+              <a:solidFill>
+                <a:schemeClr val="tx1"/>
+              </a:solidFill>
+              <a:latin typeface="Times New Roman" panose="02020603050405020304" pitchFamily="18" charset="0"/>
+              <a:ea typeface="宋体" panose="02010600030101010101" pitchFamily="2" charset="-122"/>
+              <a:cs typeface="Times New Roman" panose="02020603050405020304" pitchFamily="18" charset="0"/>
+            </a:endParaRPr>
+          </a:p>
+        </p:txBody>
+      </p:sp>
+      <p:sp>
+        <p:nvSpPr>
+          <p:cNvPr id="60" name="矩形 59"/>
+          <p:cNvSpPr/>
+          <p:nvPr/>
+        </p:nvSpPr>
+        <p:spPr>
+          <a:xfrm>
+            <a:off x="5977255" y="2355850"/>
+            <a:ext cx="720725" cy="443230"/>
+          </a:xfrm>
+          <a:prstGeom prst="rect">
+            <a:avLst/>
+          </a:prstGeom>
+          <a:solidFill>
+            <a:schemeClr val="bg1"/>
+          </a:solidFill>
+        </p:spPr>
+        <p:style>
+          <a:lnRef idx="2">
+            <a:schemeClr val="accent1">
+              <a:shade val="50000"/>
+            </a:schemeClr>
+          </a:lnRef>
+          <a:fillRef idx="1">
+            <a:schemeClr val="accent1"/>
+          </a:fillRef>
+          <a:effectRef idx="0">
+            <a:schemeClr val="accent1"/>
+          </a:effectRef>
+          <a:fontRef idx="minor">
+            <a:schemeClr val="lt1"/>
+          </a:fontRef>
+        </p:style>
+        <p:txBody>
+          <a:bodyPr rtlCol="0" anchor="ctr"/>
+          <a:p>
+            <a:pPr algn="ctr"/>
+            <a:r>
+              <a:rPr lang="zh-CN" altLang="en-US" sz="1050" b="1" dirty="0">
+                <a:solidFill>
+                  <a:schemeClr val="tx1"/>
+                </a:solidFill>
+                <a:latin typeface="Times New Roman" panose="02020603050405020304" pitchFamily="18" charset="0"/>
+                <a:ea typeface="宋体" panose="02010600030101010101" pitchFamily="2" charset="-122"/>
+                <a:cs typeface="Times New Roman" panose="02020603050405020304" pitchFamily="18" charset="0"/>
+                <a:sym typeface="+mn-ea"/>
+              </a:rPr>
+              <a:t>无人机质点运动学</a:t>
+            </a:r>
+            <a:endParaRPr lang="zh-CN" altLang="en-US" sz="1050" b="1" dirty="0">
+              <a:solidFill>
+                <a:schemeClr val="tx1"/>
+              </a:solidFill>
+              <a:latin typeface="Times New Roman" panose="02020603050405020304" pitchFamily="18" charset="0"/>
+              <a:ea typeface="宋体" panose="02010600030101010101" pitchFamily="2" charset="-122"/>
+              <a:cs typeface="Times New Roman" panose="02020603050405020304" pitchFamily="18" charset="0"/>
+            </a:endParaRPr>
+          </a:p>
+        </p:txBody>
+      </p:sp>
+      <p:cxnSp>
+        <p:nvCxnSpPr>
+          <p:cNvPr id="61" name="直接箭头连接符 60"/>
+          <p:cNvCxnSpPr>
+            <a:stCxn id="59" idx="3"/>
+            <a:endCxn id="60" idx="1"/>
+          </p:cNvCxnSpPr>
+          <p:nvPr/>
+        </p:nvCxnSpPr>
+        <p:spPr>
+          <a:xfrm>
+            <a:off x="4843145" y="2577465"/>
+            <a:ext cx="1134110" cy="0"/>
+          </a:xfrm>
+          <a:prstGeom prst="straightConnector1">
+            <a:avLst/>
+          </a:prstGeom>
+          <a:ln>
+            <a:tailEnd type="triangle"/>
+          </a:ln>
+        </p:spPr>
+        <p:style>
+          <a:lnRef idx="3">
+            <a:schemeClr val="dk1"/>
+          </a:lnRef>
+          <a:fillRef idx="0">
+            <a:schemeClr val="dk1"/>
+          </a:fillRef>
+          <a:effectRef idx="2">
+            <a:schemeClr val="dk1"/>
+          </a:effectRef>
+          <a:fontRef idx="minor">
+            <a:schemeClr val="tx1"/>
+          </a:fontRef>
+        </p:style>
+      </p:cxnSp>
+      <p:cxnSp>
+        <p:nvCxnSpPr>
+          <p:cNvPr id="62" name="连接符: 肘形 96"/>
+          <p:cNvCxnSpPr>
+            <a:stCxn id="9" idx="3"/>
+            <a:endCxn id="59" idx="1"/>
+          </p:cNvCxnSpPr>
+          <p:nvPr/>
+        </p:nvCxnSpPr>
+        <p:spPr>
+          <a:xfrm flipV="1">
+            <a:off x="2065655" y="2577465"/>
+            <a:ext cx="2056765" cy="767715"/>
+          </a:xfrm>
+          <a:prstGeom prst="bentConnector3">
+            <a:avLst>
+              <a:gd name="adj1" fmla="val 50015"/>
+            </a:avLst>
+          </a:prstGeom>
+          <a:ln>
+            <a:tailEnd type="triangle"/>
+          </a:ln>
+        </p:spPr>
+        <p:style>
+          <a:lnRef idx="3">
+            <a:schemeClr val="dk1"/>
+          </a:lnRef>
+          <a:fillRef idx="0">
+            <a:schemeClr val="dk1"/>
+          </a:fillRef>
+          <a:effectRef idx="2">
+            <a:schemeClr val="dk1"/>
+          </a:effectRef>
+          <a:fontRef idx="minor">
+            <a:schemeClr val="tx1"/>
+          </a:fontRef>
+        </p:style>
+      </p:cxnSp>
+      <p:pic>
+        <p:nvPicPr>
+          <p:cNvPr id="63" name="图片 62" descr="2020-06-25 18-35-01屏幕截图"/>
+          <p:cNvPicPr>
+            <a:picLocks noChangeAspect="1"/>
+          </p:cNvPicPr>
+          <p:nvPr/>
+        </p:nvPicPr>
+        <p:blipFill>
+          <a:blip r:embed="rId3"/>
+          <a:stretch>
+            <a:fillRect/>
+          </a:stretch>
+        </p:blipFill>
+        <p:spPr>
+          <a:xfrm>
+            <a:off x="4194175" y="2383790"/>
+            <a:ext cx="576580" cy="387350"/>
+          </a:xfrm>
+          <a:prstGeom prst="rect">
+            <a:avLst/>
+          </a:prstGeom>
+        </p:spPr>
+      </p:pic>
+      <p:cxnSp>
+        <p:nvCxnSpPr>
+          <p:cNvPr id="64" name="连接符: 肘形 96"/>
+          <p:cNvCxnSpPr>
+            <a:stCxn id="60" idx="3"/>
+            <a:endCxn id="33" idx="4"/>
+          </p:cNvCxnSpPr>
+          <p:nvPr/>
+        </p:nvCxnSpPr>
+        <p:spPr>
+          <a:xfrm flipH="1">
+            <a:off x="975360" y="2577465"/>
+            <a:ext cx="5722620" cy="906145"/>
+          </a:xfrm>
+          <a:prstGeom prst="bentConnector4">
+            <a:avLst>
+              <a:gd name="adj1" fmla="val -4161"/>
+              <a:gd name="adj2" fmla="val 126279"/>
+            </a:avLst>
+          </a:prstGeom>
+          <a:ln>
+            <a:tailEnd type="triangle"/>
+          </a:ln>
+        </p:spPr>
+        <p:style>
+          <a:lnRef idx="3">
+            <a:schemeClr val="dk1"/>
+          </a:lnRef>
+          <a:fillRef idx="0">
+            <a:schemeClr val="dk1"/>
+          </a:fillRef>
+          <a:effectRef idx="2">
+            <a:schemeClr val="dk1"/>
+          </a:effectRef>
+          <a:fontRef idx="minor">
+            <a:schemeClr val="tx1"/>
+          </a:fontRef>
+        </p:style>
+      </p:cxnSp>
+      <p:sp>
+        <p:nvSpPr>
+          <p:cNvPr id="65" name="矩形 64"/>
+          <p:cNvSpPr/>
+          <p:nvPr/>
+        </p:nvSpPr>
+        <p:spPr>
+          <a:xfrm>
+            <a:off x="2884170" y="1861185"/>
+            <a:ext cx="1163320" cy="2898775"/>
+          </a:xfrm>
+          <a:prstGeom prst="rect">
+            <a:avLst/>
+          </a:prstGeom>
+          <a:noFill/>
+          <a:ln>
+            <a:solidFill>
+              <a:srgbClr val="FF0000"/>
+            </a:solidFill>
+            <a:prstDash val="dashDot"/>
+          </a:ln>
+          <a:extLst>
+            <a:ext uri="{909E8E84-426E-40DD-AFC4-6F175D3DCCD1}">
+              <a14:hiddenFill xmlns:a14="http://schemas.microsoft.com/office/drawing/2010/main">
+                <a:solidFill>
+                  <a:schemeClr val="bg1"/>
+                </a:solidFill>
+              </a14:hiddenFill>
+            </a:ext>
+          </a:extLst>
+        </p:spPr>
+        <p:style>
+          <a:lnRef idx="2">
+            <a:schemeClr val="accent1">
+              <a:shade val="50000"/>
+            </a:schemeClr>
+          </a:lnRef>
+          <a:fillRef idx="1">
+            <a:schemeClr val="accent1"/>
+          </a:fillRef>
+          <a:effectRef idx="0">
+            <a:schemeClr val="accent1"/>
+          </a:effectRef>
+          <a:fontRef idx="minor">
+            <a:schemeClr val="lt1"/>
+          </a:fontRef>
+        </p:style>
+        <p:txBody>
+          <a:bodyPr rtlCol="0" anchor="ctr"/>
+          <a:p>
+            <a:pPr algn="ctr"/>
+            <a:endParaRPr lang="zh-CN" altLang="en-US" sz="1050" b="1" dirty="0">
+              <a:solidFill>
+                <a:schemeClr val="tx1"/>
+              </a:solidFill>
+              <a:latin typeface="Times New Roman" panose="02020603050405020304" pitchFamily="18" charset="0"/>
+              <a:ea typeface="宋体" panose="02010600030101010101" pitchFamily="2" charset="-122"/>
+              <a:cs typeface="Times New Roman" panose="02020603050405020304" pitchFamily="18" charset="0"/>
+            </a:endParaRPr>
+          </a:p>
+        </p:txBody>
+      </p:sp>
+      <p:sp>
+        <p:nvSpPr>
+          <p:cNvPr id="66" name="矩形 65"/>
+          <p:cNvSpPr/>
+          <p:nvPr/>
+        </p:nvSpPr>
+        <p:spPr>
+          <a:xfrm>
+            <a:off x="431800" y="1860550"/>
+            <a:ext cx="2452370" cy="2898775"/>
+          </a:xfrm>
+          <a:prstGeom prst="rect">
+            <a:avLst/>
+          </a:prstGeom>
+          <a:noFill/>
+          <a:ln>
+            <a:solidFill>
+              <a:srgbClr val="FF0000"/>
+            </a:solidFill>
+            <a:prstDash val="dashDot"/>
+          </a:ln>
+          <a:extLst>
+            <a:ext uri="{909E8E84-426E-40DD-AFC4-6F175D3DCCD1}">
+              <a14:hiddenFill xmlns:a14="http://schemas.microsoft.com/office/drawing/2010/main">
+                <a:solidFill>
+                  <a:schemeClr val="bg1"/>
+                </a:solidFill>
+              </a14:hiddenFill>
+            </a:ext>
+          </a:extLst>
+        </p:spPr>
+        <p:style>
+          <a:lnRef idx="2">
+            <a:schemeClr val="accent1">
+              <a:shade val="50000"/>
+            </a:schemeClr>
+          </a:lnRef>
+          <a:fillRef idx="1">
+            <a:schemeClr val="accent1"/>
+          </a:fillRef>
+          <a:effectRef idx="0">
+            <a:schemeClr val="accent1"/>
+          </a:effectRef>
+          <a:fontRef idx="minor">
+            <a:schemeClr val="lt1"/>
+          </a:fontRef>
+        </p:style>
+        <p:txBody>
+          <a:bodyPr rtlCol="0" anchor="ctr"/>
+          <a:p>
+            <a:pPr algn="ctr"/>
+            <a:endParaRPr lang="zh-CN" altLang="en-US" sz="1050" b="1" dirty="0">
+              <a:solidFill>
+                <a:schemeClr val="tx1"/>
+              </a:solidFill>
+              <a:latin typeface="Times New Roman" panose="02020603050405020304" pitchFamily="18" charset="0"/>
+              <a:ea typeface="宋体" panose="02010600030101010101" pitchFamily="2" charset="-122"/>
+              <a:cs typeface="Times New Roman" panose="02020603050405020304" pitchFamily="18" charset="0"/>
+            </a:endParaRPr>
+          </a:p>
+        </p:txBody>
+      </p:sp>
+      <p:sp>
+        <p:nvSpPr>
+          <p:cNvPr id="72" name="矩形 71"/>
+          <p:cNvSpPr/>
+          <p:nvPr/>
+        </p:nvSpPr>
+        <p:spPr>
+          <a:xfrm>
+            <a:off x="4047490" y="1861185"/>
+            <a:ext cx="3158490" cy="2898140"/>
+          </a:xfrm>
+          <a:prstGeom prst="rect">
+            <a:avLst/>
+          </a:prstGeom>
+          <a:noFill/>
+          <a:ln>
+            <a:solidFill>
+              <a:srgbClr val="FF0000"/>
+            </a:solidFill>
+            <a:prstDash val="dashDot"/>
+          </a:ln>
+          <a:extLst>
+            <a:ext uri="{909E8E84-426E-40DD-AFC4-6F175D3DCCD1}">
+              <a14:hiddenFill xmlns:a14="http://schemas.microsoft.com/office/drawing/2010/main">
+                <a:solidFill>
+                  <a:schemeClr val="bg1"/>
+                </a:solidFill>
+              </a14:hiddenFill>
+            </a:ext>
+          </a:extLst>
+        </p:spPr>
+        <p:style>
+          <a:lnRef idx="2">
+            <a:schemeClr val="accent1">
+              <a:shade val="50000"/>
+            </a:schemeClr>
+          </a:lnRef>
+          <a:fillRef idx="1">
+            <a:schemeClr val="accent1"/>
+          </a:fillRef>
+          <a:effectRef idx="0">
+            <a:schemeClr val="accent1"/>
+          </a:effectRef>
+          <a:fontRef idx="minor">
+            <a:schemeClr val="lt1"/>
+          </a:fontRef>
+        </p:style>
+        <p:txBody>
+          <a:bodyPr rtlCol="0" anchor="ctr"/>
+          <a:p>
+            <a:pPr algn="ctr"/>
+            <a:endParaRPr lang="zh-CN" altLang="en-US" sz="1050" b="1" dirty="0">
+              <a:solidFill>
+                <a:schemeClr val="tx1"/>
+              </a:solidFill>
+              <a:latin typeface="Times New Roman" panose="02020603050405020304" pitchFamily="18" charset="0"/>
+              <a:ea typeface="宋体" panose="02010600030101010101" pitchFamily="2" charset="-122"/>
+              <a:cs typeface="Times New Roman" panose="02020603050405020304" pitchFamily="18" charset="0"/>
+            </a:endParaRPr>
+          </a:p>
+        </p:txBody>
+      </p:sp>
+      <p:sp>
+        <p:nvSpPr>
+          <p:cNvPr id="73" name="矩形 72"/>
+          <p:cNvSpPr/>
+          <p:nvPr/>
+        </p:nvSpPr>
+        <p:spPr>
+          <a:xfrm>
+            <a:off x="2884170" y="1860550"/>
+            <a:ext cx="1163320" cy="2898775"/>
+          </a:xfrm>
+          <a:prstGeom prst="rect">
+            <a:avLst/>
+          </a:prstGeom>
+          <a:noFill/>
+          <a:ln>
+            <a:solidFill>
+              <a:srgbClr val="FF0000"/>
+            </a:solidFill>
+            <a:prstDash val="dashDot"/>
+          </a:ln>
+          <a:extLst>
+            <a:ext uri="{909E8E84-426E-40DD-AFC4-6F175D3DCCD1}">
+              <a14:hiddenFill xmlns:a14="http://schemas.microsoft.com/office/drawing/2010/main">
+                <a:solidFill>
+                  <a:schemeClr val="bg1"/>
+                </a:solidFill>
+              </a14:hiddenFill>
+            </a:ext>
+          </a:extLst>
+        </p:spPr>
+        <p:style>
+          <a:lnRef idx="2">
+            <a:schemeClr val="accent1">
+              <a:shade val="50000"/>
+            </a:schemeClr>
+          </a:lnRef>
+          <a:fillRef idx="1">
+            <a:schemeClr val="accent1"/>
+          </a:fillRef>
+          <a:effectRef idx="0">
+            <a:schemeClr val="accent1"/>
+          </a:effectRef>
+          <a:fontRef idx="minor">
+            <a:schemeClr val="lt1"/>
+          </a:fontRef>
+        </p:style>
+        <p:txBody>
+          <a:bodyPr rtlCol="0" anchor="ctr"/>
+          <a:p>
+            <a:pPr algn="ctr"/>
+            <a:endParaRPr lang="zh-CN" altLang="en-US" sz="1050" b="1" dirty="0">
+              <a:solidFill>
+                <a:schemeClr val="tx1"/>
+              </a:solidFill>
+              <a:latin typeface="Times New Roman" panose="02020603050405020304" pitchFamily="18" charset="0"/>
+              <a:ea typeface="宋体" panose="02010600030101010101" pitchFamily="2" charset="-122"/>
+              <a:cs typeface="Times New Roman" panose="02020603050405020304" pitchFamily="18" charset="0"/>
+            </a:endParaRPr>
+          </a:p>
+        </p:txBody>
+      </p:sp>
+      <p:sp>
+        <p:nvSpPr>
+          <p:cNvPr id="74" name="矩形 73"/>
+          <p:cNvSpPr/>
+          <p:nvPr/>
+        </p:nvSpPr>
+        <p:spPr>
+          <a:xfrm>
+            <a:off x="431800" y="2997200"/>
+            <a:ext cx="6774180" cy="1763395"/>
+          </a:xfrm>
+          <a:prstGeom prst="rect">
+            <a:avLst/>
+          </a:prstGeom>
+          <a:noFill/>
+          <a:ln>
+            <a:solidFill>
+              <a:srgbClr val="FF0000"/>
+            </a:solidFill>
+            <a:prstDash val="dashDot"/>
+          </a:ln>
+          <a:extLst>
+            <a:ext uri="{909E8E84-426E-40DD-AFC4-6F175D3DCCD1}">
+              <a14:hiddenFill xmlns:a14="http://schemas.microsoft.com/office/drawing/2010/main">
+                <a:solidFill>
+                  <a:schemeClr val="bg1"/>
+                </a:solidFill>
+              </a14:hiddenFill>
+            </a:ext>
+          </a:extLst>
+        </p:spPr>
+        <p:style>
+          <a:lnRef idx="2">
+            <a:schemeClr val="accent1">
+              <a:shade val="50000"/>
+            </a:schemeClr>
+          </a:lnRef>
+          <a:fillRef idx="1">
+            <a:schemeClr val="accent1"/>
+          </a:fillRef>
+          <a:effectRef idx="0">
+            <a:schemeClr val="accent1"/>
+          </a:effectRef>
+          <a:fontRef idx="minor">
+            <a:schemeClr val="lt1"/>
+          </a:fontRef>
+        </p:style>
+        <p:txBody>
+          <a:bodyPr rtlCol="0" anchor="ctr"/>
+          <a:p>
+            <a:pPr algn="ctr"/>
+            <a:endParaRPr lang="zh-CN" altLang="en-US" sz="1050" b="1" dirty="0">
+              <a:solidFill>
+                <a:schemeClr val="tx1"/>
+              </a:solidFill>
+              <a:latin typeface="Times New Roman" panose="02020603050405020304" pitchFamily="18" charset="0"/>
+              <a:ea typeface="宋体" panose="02010600030101010101" pitchFamily="2" charset="-122"/>
+              <a:cs typeface="Times New Roman" panose="02020603050405020304" pitchFamily="18" charset="0"/>
+            </a:endParaRPr>
+          </a:p>
+        </p:txBody>
+      </p:sp>
+      <p:sp>
+        <p:nvSpPr>
+          <p:cNvPr id="75" name="文本框 74"/>
+          <p:cNvSpPr txBox="1"/>
+          <p:nvPr/>
+        </p:nvSpPr>
+        <p:spPr>
+          <a:xfrm>
+            <a:off x="175260" y="1938655"/>
+            <a:ext cx="256540" cy="829945"/>
+          </a:xfrm>
+          <a:prstGeom prst="rect">
+            <a:avLst/>
+          </a:prstGeom>
+          <a:noFill/>
+        </p:spPr>
+        <p:txBody>
+          <a:bodyPr wrap="square" rtlCol="0" anchor="t">
+            <a:spAutoFit/>
+          </a:bodyPr>
+          <a:p>
+            <a:pPr algn="ctr"/>
+            <a:r>
+              <a:rPr lang="zh-CN" altLang="en-US" sz="1200">
+                <a:solidFill>
+                  <a:srgbClr val="FF0000"/>
+                </a:solidFill>
+              </a:rPr>
+              <a:t>数学仿真</a:t>
+            </a:r>
+            <a:endParaRPr lang="zh-CN" altLang="en-US" sz="1200">
+              <a:solidFill>
+                <a:srgbClr val="FF0000"/>
+              </a:solidFill>
+            </a:endParaRPr>
+          </a:p>
+        </p:txBody>
+      </p:sp>
+      <p:sp>
+        <p:nvSpPr>
+          <p:cNvPr id="76" name="文本框 75"/>
+          <p:cNvSpPr txBox="1"/>
+          <p:nvPr/>
+        </p:nvSpPr>
+        <p:spPr>
+          <a:xfrm>
+            <a:off x="175260" y="3371850"/>
+            <a:ext cx="256540" cy="1014730"/>
+          </a:xfrm>
+          <a:prstGeom prst="rect">
+            <a:avLst/>
+          </a:prstGeom>
+          <a:noFill/>
+        </p:spPr>
+        <p:txBody>
+          <a:bodyPr wrap="square" rtlCol="0" anchor="t">
+            <a:spAutoFit/>
+          </a:bodyPr>
+          <a:p>
+            <a:pPr algn="ctr"/>
+            <a:r>
+              <a:rPr lang="zh-CN" altLang="en-US" sz="1200">
+                <a:solidFill>
+                  <a:srgbClr val="FF0000"/>
+                </a:solidFill>
+              </a:rPr>
+              <a:t>动力学仿真</a:t>
+            </a:r>
+            <a:endParaRPr lang="zh-CN" altLang="en-US" sz="1200">
+              <a:solidFill>
+                <a:srgbClr val="FF0000"/>
+              </a:solidFill>
             </a:endParaRPr>
           </a:p>
         </p:txBody>

</xml_diff>